<commit_message>
Last Update 05-10-2018 15:45:09.80
</commit_message>
<xml_diff>
--- a/Slides/Unit 2/GE8151-U2-3-Functions.pptx
+++ b/Slides/Unit 2/GE8151-U2-3-Functions.pptx
@@ -5,7 +5,7 @@
     <p:sldMasterId id="2147483648" r:id="rId1"/>
   </p:sldMasterIdLst>
   <p:notesMasterIdLst>
-    <p:notesMasterId r:id="rId12"/>
+    <p:notesMasterId r:id="rId14"/>
   </p:notesMasterIdLst>
   <p:sldIdLst>
     <p:sldId id="256" r:id="rId2"/>
@@ -17,7 +17,9 @@
     <p:sldId id="281" r:id="rId8"/>
     <p:sldId id="282" r:id="rId9"/>
     <p:sldId id="283" r:id="rId10"/>
-    <p:sldId id="272" r:id="rId11"/>
+    <p:sldId id="285" r:id="rId11"/>
+    <p:sldId id="284" r:id="rId12"/>
+    <p:sldId id="272" r:id="rId13"/>
   </p:sldIdLst>
   <p:sldSz cx="9144000" cy="6858000" type="screen4x3"/>
   <p:notesSz cx="6858000" cy="9144000"/>
@@ -3719,6 +3721,229 @@
             <p:ph type="title"/>
           </p:nvPr>
         </p:nvSpPr>
+        <p:spPr/>
+        <p:txBody>
+          <a:bodyPr/>
+          <a:lstStyle/>
+          <a:p>
+            <a:r>
+              <a:rPr lang="en-IN" dirty="0" smtClean="0"/>
+              <a:t>Task</a:t>
+            </a:r>
+            <a:endParaRPr lang="en-US" dirty="0"/>
+          </a:p>
+        </p:txBody>
+      </p:sp>
+      <p:sp>
+        <p:nvSpPr>
+          <p:cNvPr id="3" name="Content Placeholder 2"/>
+          <p:cNvSpPr>
+            <a:spLocks noGrp="1"/>
+          </p:cNvSpPr>
+          <p:nvPr>
+            <p:ph idx="1"/>
+          </p:nvPr>
+        </p:nvSpPr>
+        <p:spPr/>
+        <p:txBody>
+          <a:bodyPr/>
+          <a:lstStyle/>
+          <a:p>
+            <a:pPr marL="514350" indent="-514350">
+              <a:buFont typeface="+mj-lt"/>
+              <a:buAutoNum type="arabicPeriod"/>
+            </a:pPr>
+            <a:r>
+              <a:rPr lang="en-IN" dirty="0" smtClean="0"/>
+              <a:t>Try some previous programs</a:t>
+            </a:r>
+          </a:p>
+          <a:p>
+            <a:pPr marL="914400" lvl="1" indent="-514350">
+              <a:buFont typeface="+mj-lt"/>
+              <a:buAutoNum type="arabicPeriod"/>
+            </a:pPr>
+            <a:r>
+              <a:rPr lang="en-IN" dirty="0" smtClean="0"/>
+              <a:t>Exchange values of the variables.</a:t>
+            </a:r>
+          </a:p>
+          <a:p>
+            <a:pPr marL="914400" lvl="1" indent="-514350">
+              <a:buFont typeface="+mj-lt"/>
+              <a:buAutoNum type="arabicPeriod"/>
+            </a:pPr>
+            <a:r>
+              <a:rPr lang="en-IN" dirty="0" smtClean="0"/>
+              <a:t>Circulate the values of n variables.</a:t>
+            </a:r>
+          </a:p>
+          <a:p>
+            <a:pPr marL="914400" lvl="1" indent="-514350">
+              <a:buFont typeface="+mj-lt"/>
+              <a:buAutoNum type="arabicPeriod"/>
+            </a:pPr>
+            <a:r>
+              <a:rPr lang="en-IN" dirty="0" smtClean="0"/>
+              <a:t>Guess a number in integer range.</a:t>
+            </a:r>
+          </a:p>
+        </p:txBody>
+      </p:sp>
+    </p:spTree>
+  </p:cSld>
+  <p:clrMapOvr>
+    <a:masterClrMapping/>
+  </p:clrMapOvr>
+</p:sld>
+</file>
+
+<file path=ppt/slides/slide11.xml><?xml version="1.0" encoding="utf-8"?>
+<p:sld xmlns:a="http://schemas.openxmlformats.org/drawingml/2006/main" xmlns:r="http://schemas.openxmlformats.org/officeDocument/2006/relationships" xmlns:p="http://schemas.openxmlformats.org/presentationml/2006/main">
+  <p:cSld>
+    <p:spTree>
+      <p:nvGrpSpPr>
+        <p:cNvPr id="1" name=""/>
+        <p:cNvGrpSpPr/>
+        <p:nvPr/>
+      </p:nvGrpSpPr>
+      <p:grpSpPr>
+        <a:xfrm>
+          <a:off x="0" y="0"/>
+          <a:ext cx="0" cy="0"/>
+          <a:chOff x="0" y="0"/>
+          <a:chExt cx="0" cy="0"/>
+        </a:xfrm>
+      </p:grpSpPr>
+      <p:sp>
+        <p:nvSpPr>
+          <p:cNvPr id="2" name="Title 1"/>
+          <p:cNvSpPr>
+            <a:spLocks noGrp="1"/>
+          </p:cNvSpPr>
+          <p:nvPr>
+            <p:ph type="title"/>
+          </p:nvPr>
+        </p:nvSpPr>
+        <p:spPr/>
+        <p:txBody>
+          <a:bodyPr/>
+          <a:lstStyle/>
+          <a:p>
+            <a:r>
+              <a:rPr lang="en-IN" dirty="0" smtClean="0"/>
+              <a:t>Types of Functions</a:t>
+            </a:r>
+            <a:endParaRPr lang="en-US" dirty="0"/>
+          </a:p>
+        </p:txBody>
+      </p:sp>
+      <p:sp>
+        <p:nvSpPr>
+          <p:cNvPr id="3" name="Content Placeholder 2"/>
+          <p:cNvSpPr>
+            <a:spLocks noGrp="1"/>
+          </p:cNvSpPr>
+          <p:nvPr>
+            <p:ph idx="1"/>
+          </p:nvPr>
+        </p:nvSpPr>
+        <p:spPr/>
+        <p:txBody>
+          <a:bodyPr/>
+          <a:lstStyle/>
+          <a:p>
+            <a:r>
+              <a:rPr lang="en-IN" dirty="0" smtClean="0"/>
+              <a:t>Based of Parameters</a:t>
+            </a:r>
+          </a:p>
+          <a:p>
+            <a:pPr lvl="1"/>
+            <a:r>
+              <a:rPr lang="en-IN" dirty="0" smtClean="0"/>
+              <a:t>Functions without parameters</a:t>
+            </a:r>
+          </a:p>
+          <a:p>
+            <a:pPr lvl="1"/>
+            <a:r>
+              <a:rPr lang="en-IN" dirty="0" smtClean="0"/>
+              <a:t>Function with parameters</a:t>
+            </a:r>
+          </a:p>
+          <a:p>
+            <a:r>
+              <a:rPr lang="en-IN" dirty="0" smtClean="0"/>
+              <a:t>Types of Arguments</a:t>
+            </a:r>
+          </a:p>
+          <a:p>
+            <a:pPr lvl="1"/>
+            <a:r>
+              <a:rPr lang="en-IN" dirty="0" smtClean="0"/>
+              <a:t>Default Arguments</a:t>
+            </a:r>
+          </a:p>
+          <a:p>
+            <a:pPr lvl="1"/>
+            <a:r>
+              <a:rPr lang="en-IN" dirty="0" smtClean="0"/>
+              <a:t>Keyword Arguments</a:t>
+            </a:r>
+          </a:p>
+          <a:p>
+            <a:pPr lvl="1"/>
+            <a:r>
+              <a:rPr lang="en-IN" dirty="0" smtClean="0"/>
+              <a:t>Arbitrary </a:t>
+            </a:r>
+            <a:r>
+              <a:rPr lang="en-IN" dirty="0" smtClean="0"/>
+              <a:t>Arguments</a:t>
+            </a:r>
+          </a:p>
+          <a:p>
+            <a:pPr lvl="1"/>
+            <a:endParaRPr lang="en-IN" dirty="0" smtClean="0"/>
+          </a:p>
+        </p:txBody>
+      </p:sp>
+    </p:spTree>
+  </p:cSld>
+  <p:clrMapOvr>
+    <a:masterClrMapping/>
+  </p:clrMapOvr>
+</p:sld>
+</file>
+
+<file path=ppt/slides/slide12.xml><?xml version="1.0" encoding="utf-8"?>
+<p:sld xmlns:a="http://schemas.openxmlformats.org/drawingml/2006/main" xmlns:r="http://schemas.openxmlformats.org/officeDocument/2006/relationships" xmlns:p="http://schemas.openxmlformats.org/presentationml/2006/main">
+  <p:cSld>
+    <p:spTree>
+      <p:nvGrpSpPr>
+        <p:cNvPr id="1" name=""/>
+        <p:cNvGrpSpPr/>
+        <p:nvPr/>
+      </p:nvGrpSpPr>
+      <p:grpSpPr>
+        <a:xfrm>
+          <a:off x="0" y="0"/>
+          <a:ext cx="0" cy="0"/>
+          <a:chOff x="0" y="0"/>
+          <a:chExt cx="0" cy="0"/>
+        </a:xfrm>
+      </p:grpSpPr>
+      <p:sp>
+        <p:nvSpPr>
+          <p:cNvPr id="2" name="Title 1"/>
+          <p:cNvSpPr>
+            <a:spLocks noGrp="1"/>
+          </p:cNvSpPr>
+          <p:nvPr>
+            <p:ph type="title"/>
+          </p:nvPr>
+        </p:nvSpPr>
         <p:spPr>
           <a:xfrm>
             <a:off x="457200" y="1981200"/>
@@ -7785,14 +8010,7 @@
                 <a:latin typeface="Cambria" pitchFamily="18" charset="0"/>
                 <a:ea typeface="Cambria" pitchFamily="18" charset="0"/>
               </a:rPr>
-              <a:t>d</a:t>
-            </a:r>
-            <a:r>
-              <a:rPr lang="en-IN" sz="3000" dirty="0" smtClean="0">
-                <a:latin typeface="Cambria" pitchFamily="18" charset="0"/>
-                <a:ea typeface="Cambria" pitchFamily="18" charset="0"/>
-              </a:rPr>
-              <a:t>ef  </a:t>
+              <a:t>def  </a:t>
             </a:r>
             <a:r>
               <a:rPr lang="en-IN" sz="3000" dirty="0" err="1" smtClean="0">
@@ -7806,21 +8024,20 @@
                 <a:latin typeface="Cambria" pitchFamily="18" charset="0"/>
                 <a:ea typeface="Cambria" pitchFamily="18" charset="0"/>
               </a:rPr>
-              <a:t>(</a:t>
-            </a:r>
-            <a:r>
-              <a:rPr lang="en-IN" sz="3000" dirty="0" err="1" smtClean="0">
-                <a:latin typeface="Cambria" pitchFamily="18" charset="0"/>
-                <a:ea typeface="Cambria" pitchFamily="18" charset="0"/>
-              </a:rPr>
-              <a:t>argument_list</a:t>
-            </a:r>
+              <a:t>(parameters)</a:t>
+            </a:r>
+            <a:endParaRPr lang="en-IN" sz="3000" dirty="0" smtClean="0">
+              <a:latin typeface="Cambria" pitchFamily="18" charset="0"/>
+              <a:ea typeface="Cambria" pitchFamily="18" charset="0"/>
+            </a:endParaRPr>
+          </a:p>
+          <a:p>
             <a:r>
               <a:rPr lang="en-IN" sz="3000" dirty="0" smtClean="0">
                 <a:latin typeface="Cambria" pitchFamily="18" charset="0"/>
                 <a:ea typeface="Cambria" pitchFamily="18" charset="0"/>
               </a:rPr>
-              <a:t>):</a:t>
+              <a:t>	Statement 1</a:t>
             </a:r>
           </a:p>
           <a:p>
@@ -7829,14 +8046,16 @@
                 <a:latin typeface="Cambria" pitchFamily="18" charset="0"/>
                 <a:ea typeface="Cambria" pitchFamily="18" charset="0"/>
               </a:rPr>
-              <a:t>	</a:t>
-            </a:r>
+              <a:t>	Statement 2</a:t>
+            </a:r>
+          </a:p>
+          <a:p>
             <a:r>
               <a:rPr lang="en-IN" sz="3000" dirty="0" smtClean="0">
                 <a:latin typeface="Cambria" pitchFamily="18" charset="0"/>
                 <a:ea typeface="Cambria" pitchFamily="18" charset="0"/>
               </a:rPr>
-              <a:t>Statement 1</a:t>
+              <a:t>	.</a:t>
             </a:r>
           </a:p>
           <a:p>
@@ -7845,14 +8064,16 @@
                 <a:latin typeface="Cambria" pitchFamily="18" charset="0"/>
                 <a:ea typeface="Cambria" pitchFamily="18" charset="0"/>
               </a:rPr>
-              <a:t>	</a:t>
-            </a:r>
+              <a:t>	.</a:t>
+            </a:r>
+          </a:p>
+          <a:p>
             <a:r>
               <a:rPr lang="en-IN" sz="3000" dirty="0" smtClean="0">
                 <a:latin typeface="Cambria" pitchFamily="18" charset="0"/>
                 <a:ea typeface="Cambria" pitchFamily="18" charset="0"/>
               </a:rPr>
-              <a:t>Statement 2</a:t>
+              <a:t>	.</a:t>
             </a:r>
           </a:p>
           <a:p>
@@ -7861,62 +8082,7 @@
                 <a:latin typeface="Cambria" pitchFamily="18" charset="0"/>
                 <a:ea typeface="Cambria" pitchFamily="18" charset="0"/>
               </a:rPr>
-              <a:t>	</a:t>
-            </a:r>
-            <a:r>
-              <a:rPr lang="en-IN" sz="3000" dirty="0" smtClean="0">
-                <a:latin typeface="Cambria" pitchFamily="18" charset="0"/>
-                <a:ea typeface="Cambria" pitchFamily="18" charset="0"/>
-              </a:rPr>
-              <a:t>.</a:t>
-            </a:r>
-          </a:p>
-          <a:p>
-            <a:r>
-              <a:rPr lang="en-IN" sz="3000" dirty="0" smtClean="0">
-                <a:latin typeface="Cambria" pitchFamily="18" charset="0"/>
-                <a:ea typeface="Cambria" pitchFamily="18" charset="0"/>
-              </a:rPr>
-              <a:t>	</a:t>
-            </a:r>
-            <a:r>
-              <a:rPr lang="en-IN" sz="3000" dirty="0" smtClean="0">
-                <a:latin typeface="Cambria" pitchFamily="18" charset="0"/>
-                <a:ea typeface="Cambria" pitchFamily="18" charset="0"/>
-              </a:rPr>
-              <a:t>.</a:t>
-            </a:r>
-          </a:p>
-          <a:p>
-            <a:r>
-              <a:rPr lang="en-IN" sz="3000" dirty="0" smtClean="0">
-                <a:latin typeface="Cambria" pitchFamily="18" charset="0"/>
-                <a:ea typeface="Cambria" pitchFamily="18" charset="0"/>
-              </a:rPr>
-              <a:t>	</a:t>
-            </a:r>
-            <a:r>
-              <a:rPr lang="en-IN" sz="3000" dirty="0" smtClean="0">
-                <a:latin typeface="Cambria" pitchFamily="18" charset="0"/>
-                <a:ea typeface="Cambria" pitchFamily="18" charset="0"/>
-              </a:rPr>
-              <a:t>.</a:t>
-            </a:r>
-          </a:p>
-          <a:p>
-            <a:r>
-              <a:rPr lang="en-IN" sz="3000" dirty="0" smtClean="0">
-                <a:latin typeface="Cambria" pitchFamily="18" charset="0"/>
-                <a:ea typeface="Cambria" pitchFamily="18" charset="0"/>
-              </a:rPr>
-              <a:t>	</a:t>
-            </a:r>
-            <a:r>
-              <a:rPr lang="en-IN" sz="3000" dirty="0" smtClean="0">
-                <a:latin typeface="Cambria" pitchFamily="18" charset="0"/>
-                <a:ea typeface="Cambria" pitchFamily="18" charset="0"/>
-              </a:rPr>
-              <a:t>Statement N</a:t>
+              <a:t>	Statement N</a:t>
             </a:r>
             <a:endParaRPr lang="en-US" sz="3000" dirty="0">
               <a:latin typeface="Cambria" pitchFamily="18" charset="0"/>
@@ -8126,7 +8292,7 @@
             <a:pPr algn="ctr"/>
             <a:r>
               <a:rPr lang="en-IN" dirty="0" smtClean="0"/>
-              <a:t>Argument List</a:t>
+              <a:t>Parameter List</a:t>
             </a:r>
             <a:endParaRPr lang="en-US" dirty="0"/>
           </a:p>
@@ -8632,6 +8798,47 @@
             <a:r>
               <a:rPr lang="en-IN" dirty="0" smtClean="0"/>
               <a:t>Get n value and print no of hello’s </a:t>
+            </a:r>
+            <a:endParaRPr lang="en-IN" dirty="0" smtClean="0"/>
+          </a:p>
+          <a:p>
+            <a:pPr marL="514350" indent="-514350">
+              <a:buFont typeface="+mj-lt"/>
+              <a:buAutoNum type="arabicPeriod"/>
+            </a:pPr>
+            <a:r>
+              <a:rPr lang="en-IN" dirty="0" smtClean="0"/>
+              <a:t>Try some previous programs</a:t>
+            </a:r>
+          </a:p>
+          <a:p>
+            <a:pPr marL="914400" lvl="1" indent="-514350">
+              <a:buFont typeface="+mj-lt"/>
+              <a:buAutoNum type="arabicPeriod"/>
+            </a:pPr>
+            <a:r>
+              <a:rPr lang="en-IN" dirty="0" smtClean="0"/>
+              <a:t>Finding odd or even</a:t>
+            </a:r>
+          </a:p>
+          <a:p>
+            <a:pPr marL="914400" lvl="1" indent="-514350">
+              <a:buFont typeface="+mj-lt"/>
+              <a:buAutoNum type="arabicPeriod"/>
+            </a:pPr>
+            <a:r>
+              <a:rPr lang="en-IN" dirty="0" smtClean="0"/>
+              <a:t>Finding Area of the shape</a:t>
+            </a:r>
+          </a:p>
+          <a:p>
+            <a:pPr marL="914400" lvl="1" indent="-514350">
+              <a:buFont typeface="+mj-lt"/>
+              <a:buAutoNum type="arabicPeriod"/>
+            </a:pPr>
+            <a:r>
+              <a:rPr lang="en-IN" dirty="0" smtClean="0"/>
+              <a:t>Finding given year is leap or not</a:t>
             </a:r>
           </a:p>
         </p:txBody>

</xml_diff>